<commit_message>
Added final report template
</commit_message>
<xml_diff>
--- a/docs/datascience_poster_v2.pptx
+++ b/docs/datascience_poster_v2.pptx
@@ -4671,7 +4671,15 @@
             </a:r>
             <a:r>
               <a:rPr lang="en-US" sz="4800" dirty="0" smtClean="0"/>
-              <a:t> 629,814 </a:t>
+              <a:t> </a:t>
+            </a:r>
+            <a:r>
+              <a:rPr lang="en-US" sz="5400" dirty="0"/>
+              <a:t>4,354,534</a:t>
+            </a:r>
+            <a:r>
+              <a:rPr lang="en-US" sz="4800" dirty="0" smtClean="0"/>
+              <a:t> </a:t>
             </a:r>
             <a:r>
               <a:rPr lang="en-US" sz="4400" dirty="0" smtClean="0"/>
@@ -4965,14 +4973,14 @@
           <p:nvPr>
             <p:extLst>
               <p:ext uri="{D42A27DB-BD31-4B8C-83A1-F6EECF244321}">
-                <p14:modId xmlns:p14="http://schemas.microsoft.com/office/powerpoint/2010/main" val="310935118"/>
+                <p14:modId xmlns:p14="http://schemas.microsoft.com/office/powerpoint/2010/main" val="1886508150"/>
               </p:ext>
             </p:extLst>
           </p:nvPr>
         </p:nvGraphicFramePr>
         <p:xfrm>
-          <a:off x="1104615" y="36525200"/>
-          <a:ext cx="27270316" cy="2568547"/>
+          <a:off x="1104615" y="36585600"/>
+          <a:ext cx="27270316" cy="2233827"/>
         </p:xfrm>
         <a:graphic>
           <a:graphicData uri="http://schemas.openxmlformats.org/drawingml/2006/table">
@@ -4984,7 +4992,7 @@
                 <a:gridCol w="13635158"/>
                 <a:gridCol w="13635158"/>
               </a:tblGrid>
-              <a:tr h="1196947">
+              <a:tr h="1136547">
                 <a:tc>
                   <a:txBody>
                     <a:bodyPr/>
@@ -4992,16 +5000,24 @@
                     <a:p>
                       <a:r>
                         <a:rPr lang="en-US" sz="2400" dirty="0" smtClean="0"/>
-                        <a:t>1) Citation for data</a:t>
+                        <a:t>1) </a:t>
                       </a:r>
                       <a:r>
-                        <a:rPr lang="en-US" sz="2400" baseline="0" dirty="0" smtClean="0"/>
-                        <a:t> set goes here</a:t>
+                        <a:rPr lang="en-US" sz="2400" b="0" i="0" u="none" strike="noStrike" kern="1200" dirty="0" smtClean="0">
+                          <a:solidFill>
+                            <a:schemeClr val="tx1"/>
+                          </a:solidFill>
+                          <a:effectLst/>
+                          <a:latin typeface="+mn-lt"/>
+                          <a:ea typeface="+mn-ea"/>
+                          <a:cs typeface="+mn-cs"/>
+                        </a:rPr>
+                        <a:t>Citation Network Dataset is   [Tang et al] as of May 25, 2014</a:t>
                       </a:r>
                       <a:endParaRPr lang="en-US" sz="2400" dirty="0"/>
                     </a:p>
                   </a:txBody>
-                  <a:tcPr/>
+                  <a:tcPr marL="0" marR="0" marT="0" marB="0" anchor="ctr"/>
                 </a:tc>
                 <a:tc>
                   <a:txBody>
@@ -5055,10 +5071,10 @@
                       <a:endParaRPr lang="en-US" sz="2400" dirty="0"/>
                     </a:p>
                   </a:txBody>
-                  <a:tcPr/>
+                  <a:tcPr marL="0" marR="0" marT="0" marB="0" anchor="ctr"/>
                 </a:tc>
               </a:tr>
-              <a:tr h="0">
+              <a:tr h="347303">
                 <a:tc>
                   <a:txBody>
                     <a:bodyPr/>
@@ -5073,13 +5089,15 @@
                         <a:t> Institutional Codes crosswalk table </a:t>
                       </a:r>
                       <a:r>
-                        <a:rPr lang="en-US" sz="2400" dirty="0" smtClean="0"/>
+                        <a:rPr lang="en-US" sz="2400" dirty="0" smtClean="0">
+                          <a:hlinkClick r:id="rId5"/>
+                        </a:rPr>
                         <a:t>http://www.pesc.org/interior.php?page_id=145</a:t>
                       </a:r>
                       <a:endParaRPr lang="en-US" sz="2400" dirty="0"/>
                     </a:p>
                   </a:txBody>
-                  <a:tcPr/>
+                  <a:tcPr marL="0" marR="0" marT="0" marB="0" anchor="ctr"/>
                 </a:tc>
                 <a:tc>
                   <a:txBody>
@@ -5102,10 +5120,10 @@
                       <a:endParaRPr lang="en-US" sz="2400" dirty="0"/>
                     </a:p>
                   </a:txBody>
-                  <a:tcPr/>
+                  <a:tcPr marL="0" marR="0" marT="0" marB="0" anchor="ctr"/>
                 </a:tc>
               </a:tr>
-              <a:tr h="0">
+              <a:tr h="347303">
                 <a:tc>
                   <a:txBody>
                     <a:bodyPr/>
@@ -5114,7 +5132,7 @@
                       <a:endParaRPr lang="en-US" sz="2400" dirty="0"/>
                     </a:p>
                   </a:txBody>
-                  <a:tcPr/>
+                  <a:tcPr marL="0" marR="0" marT="0" marB="0" anchor="ctr"/>
                 </a:tc>
                 <a:tc>
                   <a:txBody>
@@ -5125,10 +5143,10 @@
                       <a:endParaRPr lang="en-US" sz="2400" dirty="0"/>
                     </a:p>
                   </a:txBody>
-                  <a:tcPr/>
+                  <a:tcPr marL="0" marR="0" marT="0" marB="0" anchor="ctr"/>
                 </a:tc>
               </a:tr>
-              <a:tr h="0">
+              <a:tr h="347303">
                 <a:tc>
                   <a:txBody>
                     <a:bodyPr/>
@@ -5137,7 +5155,7 @@
                       <a:endParaRPr lang="en-US" sz="2400" dirty="0"/>
                     </a:p>
                   </a:txBody>
-                  <a:tcPr/>
+                  <a:tcPr marL="0" marR="0" marT="0" marB="0" anchor="ctr"/>
                 </a:tc>
                 <a:tc>
                   <a:txBody>
@@ -5148,7 +5166,7 @@
                       <a:endParaRPr lang="en-US" sz="2400" dirty="0"/>
                     </a:p>
                   </a:txBody>
-                  <a:tcPr/>
+                  <a:tcPr marL="0" marR="0" marT="0" marB="0" anchor="ctr"/>
                 </a:tc>
               </a:tr>
             </a:tbl>
@@ -5630,8 +5648,8 @@
         </p:nvSpPr>
         <p:spPr>
           <a:xfrm>
-            <a:off x="272327" y="24975449"/>
-            <a:ext cx="27921946" cy="11226800"/>
+            <a:off x="272327" y="24975448"/>
+            <a:ext cx="27921946" cy="11549751"/>
           </a:xfrm>
           <a:prstGeom prst="roundRect">
             <a:avLst/>
@@ -5691,6 +5709,320 @@
               <a:t>and Interactive Search</a:t>
             </a:r>
             <a:endParaRPr lang="en-US" sz="6000" u="sng" dirty="0"/>
+          </a:p>
+        </p:txBody>
+      </p:sp>
+      <p:sp>
+        <p:nvSpPr>
+          <p:cNvPr id="56" name="Rounded Rectangle 55"/>
+          <p:cNvSpPr/>
+          <p:nvPr/>
+        </p:nvSpPr>
+        <p:spPr>
+          <a:xfrm>
+            <a:off x="648680" y="26210070"/>
+            <a:ext cx="10317988" cy="9975161"/>
+          </a:xfrm>
+          <a:prstGeom prst="roundRect">
+            <a:avLst/>
+          </a:prstGeom>
+        </p:spPr>
+        <p:style>
+          <a:lnRef idx="2">
+            <a:schemeClr val="accent5"/>
+          </a:lnRef>
+          <a:fillRef idx="1">
+            <a:schemeClr val="lt1"/>
+          </a:fillRef>
+          <a:effectRef idx="0">
+            <a:schemeClr val="accent5"/>
+          </a:effectRef>
+          <a:fontRef idx="minor">
+            <a:schemeClr val="dk1"/>
+          </a:fontRef>
+        </p:style>
+        <p:txBody>
+          <a:bodyPr rtlCol="0" anchor="ctr"/>
+          <a:lstStyle/>
+          <a:p>
+            <a:pPr algn="ctr"/>
+            <a:endParaRPr lang="en-US"/>
+          </a:p>
+        </p:txBody>
+      </p:sp>
+      <p:sp>
+        <p:nvSpPr>
+          <p:cNvPr id="209" name="Rounded Rectangle 208"/>
+          <p:cNvSpPr/>
+          <p:nvPr/>
+        </p:nvSpPr>
+        <p:spPr>
+          <a:xfrm>
+            <a:off x="15089444" y="26280376"/>
+            <a:ext cx="9753599" cy="4736798"/>
+          </a:xfrm>
+          <a:prstGeom prst="roundRect">
+            <a:avLst/>
+          </a:prstGeom>
+        </p:spPr>
+        <p:style>
+          <a:lnRef idx="2">
+            <a:schemeClr val="accent5"/>
+          </a:lnRef>
+          <a:fillRef idx="1">
+            <a:schemeClr val="lt1"/>
+          </a:fillRef>
+          <a:effectRef idx="0">
+            <a:schemeClr val="accent5"/>
+          </a:effectRef>
+          <a:fontRef idx="minor">
+            <a:schemeClr val="dk1"/>
+          </a:fontRef>
+        </p:style>
+        <p:txBody>
+          <a:bodyPr rtlCol="0" anchor="ctr"/>
+          <a:lstStyle/>
+          <a:p>
+            <a:pPr algn="ctr"/>
+            <a:endParaRPr lang="en-US"/>
+          </a:p>
+        </p:txBody>
+      </p:sp>
+      <p:sp>
+        <p:nvSpPr>
+          <p:cNvPr id="210" name="Rounded Rectangle 209"/>
+          <p:cNvSpPr/>
+          <p:nvPr/>
+        </p:nvSpPr>
+        <p:spPr>
+          <a:xfrm>
+            <a:off x="15060615" y="31521571"/>
+            <a:ext cx="9753599" cy="4736798"/>
+          </a:xfrm>
+          <a:prstGeom prst="roundRect">
+            <a:avLst/>
+          </a:prstGeom>
+        </p:spPr>
+        <p:style>
+          <a:lnRef idx="2">
+            <a:schemeClr val="accent5"/>
+          </a:lnRef>
+          <a:fillRef idx="1">
+            <a:schemeClr val="lt1"/>
+          </a:fillRef>
+          <a:effectRef idx="0">
+            <a:schemeClr val="accent5"/>
+          </a:effectRef>
+          <a:fontRef idx="minor">
+            <a:schemeClr val="dk1"/>
+          </a:fontRef>
+        </p:style>
+        <p:txBody>
+          <a:bodyPr rtlCol="0" anchor="ctr"/>
+          <a:lstStyle/>
+          <a:p>
+            <a:pPr algn="ctr"/>
+            <a:endParaRPr lang="en-US"/>
+          </a:p>
+        </p:txBody>
+      </p:sp>
+      <p:sp>
+        <p:nvSpPr>
+          <p:cNvPr id="57" name="TextBox 56"/>
+          <p:cNvSpPr txBox="1"/>
+          <p:nvPr/>
+        </p:nvSpPr>
+        <p:spPr>
+          <a:xfrm>
+            <a:off x="4469435" y="26083276"/>
+            <a:ext cx="3942561" cy="769441"/>
+          </a:xfrm>
+          <a:prstGeom prst="rect">
+            <a:avLst/>
+          </a:prstGeom>
+          <a:noFill/>
+        </p:spPr>
+        <p:txBody>
+          <a:bodyPr wrap="square" rtlCol="0">
+            <a:spAutoFit/>
+          </a:bodyPr>
+          <a:lstStyle/>
+          <a:p>
+            <a:r>
+              <a:rPr lang="en-US" sz="4400" u="sng" dirty="0" smtClean="0"/>
+              <a:t>Main Page</a:t>
+            </a:r>
+            <a:endParaRPr lang="en-US" sz="6600" u="sng" dirty="0"/>
+          </a:p>
+        </p:txBody>
+      </p:sp>
+      <p:sp>
+        <p:nvSpPr>
+          <p:cNvPr id="211" name="TextBox 210"/>
+          <p:cNvSpPr txBox="1"/>
+          <p:nvPr/>
+        </p:nvSpPr>
+        <p:spPr>
+          <a:xfrm>
+            <a:off x="17875468" y="26412656"/>
+            <a:ext cx="5530562" cy="769441"/>
+          </a:xfrm>
+          <a:prstGeom prst="rect">
+            <a:avLst/>
+          </a:prstGeom>
+          <a:noFill/>
+        </p:spPr>
+        <p:txBody>
+          <a:bodyPr wrap="square" rtlCol="0">
+            <a:spAutoFit/>
+          </a:bodyPr>
+          <a:lstStyle/>
+          <a:p>
+            <a:r>
+              <a:rPr lang="en-US" sz="4400" u="sng" dirty="0" smtClean="0"/>
+              <a:t>Search Results</a:t>
+            </a:r>
+            <a:endParaRPr lang="en-US" sz="6600" u="sng" dirty="0"/>
+          </a:p>
+        </p:txBody>
+      </p:sp>
+      <p:sp>
+        <p:nvSpPr>
+          <p:cNvPr id="212" name="TextBox 211"/>
+          <p:cNvSpPr txBox="1"/>
+          <p:nvPr/>
+        </p:nvSpPr>
+        <p:spPr>
+          <a:xfrm>
+            <a:off x="18284587" y="31572241"/>
+            <a:ext cx="5530562" cy="769441"/>
+          </a:xfrm>
+          <a:prstGeom prst="rect">
+            <a:avLst/>
+          </a:prstGeom>
+          <a:noFill/>
+        </p:spPr>
+        <p:txBody>
+          <a:bodyPr wrap="square" rtlCol="0">
+            <a:spAutoFit/>
+          </a:bodyPr>
+          <a:lstStyle/>
+          <a:p>
+            <a:r>
+              <a:rPr lang="en-US" sz="4400" u="sng" dirty="0" smtClean="0"/>
+              <a:t>Faculty Detail</a:t>
+            </a:r>
+            <a:endParaRPr lang="en-US" sz="6600" u="sng" dirty="0"/>
+          </a:p>
+        </p:txBody>
+      </p:sp>
+      <p:pic>
+        <p:nvPicPr>
+          <p:cNvPr id="58" name="Picture 57"/>
+          <p:cNvPicPr>
+            <a:picLocks noChangeAspect="1"/>
+          </p:cNvPicPr>
+          <p:nvPr/>
+        </p:nvPicPr>
+        <p:blipFill>
+          <a:blip r:embed="rId6">
+            <a:extLst>
+              <a:ext uri="{28A0092B-C50C-407E-A947-70E740481C1C}">
+                <a14:useLocalDpi xmlns:a14="http://schemas.microsoft.com/office/drawing/2010/main" val="0"/>
+              </a:ext>
+            </a:extLst>
+          </a:blip>
+          <a:stretch>
+            <a:fillRect/>
+          </a:stretch>
+        </p:blipFill>
+        <p:spPr>
+          <a:xfrm>
+            <a:off x="11596755" y="28981665"/>
+            <a:ext cx="2816911" cy="6955336"/>
+          </a:xfrm>
+          <a:prstGeom prst="rect">
+            <a:avLst/>
+          </a:prstGeom>
+        </p:spPr>
+      </p:pic>
+      <p:sp>
+        <p:nvSpPr>
+          <p:cNvPr id="260" name="Right Arrow 259"/>
+          <p:cNvSpPr/>
+          <p:nvPr/>
+        </p:nvSpPr>
+        <p:spPr>
+          <a:xfrm>
+            <a:off x="11159172" y="26804592"/>
+            <a:ext cx="3820755" cy="1638064"/>
+          </a:xfrm>
+          <a:prstGeom prst="rightArrow">
+            <a:avLst/>
+          </a:prstGeom>
+        </p:spPr>
+        <p:style>
+          <a:lnRef idx="2">
+            <a:schemeClr val="accent5"/>
+          </a:lnRef>
+          <a:fillRef idx="1">
+            <a:schemeClr val="lt1"/>
+          </a:fillRef>
+          <a:effectRef idx="0">
+            <a:schemeClr val="accent5"/>
+          </a:effectRef>
+          <a:fontRef idx="minor">
+            <a:schemeClr val="dk1"/>
+          </a:fontRef>
+        </p:style>
+        <p:txBody>
+          <a:bodyPr rtlCol="0" anchor="ctr"/>
+          <a:lstStyle/>
+          <a:p>
+            <a:pPr algn="ctr"/>
+            <a:endParaRPr lang="en-US"/>
+          </a:p>
+        </p:txBody>
+      </p:sp>
+      <p:sp>
+        <p:nvSpPr>
+          <p:cNvPr id="261" name="Curved Left Arrow 260"/>
+          <p:cNvSpPr/>
+          <p:nvPr/>
+        </p:nvSpPr>
+        <p:spPr>
+          <a:xfrm>
+            <a:off x="24843043" y="28442656"/>
+            <a:ext cx="2675453" cy="5871407"/>
+          </a:xfrm>
+          <a:prstGeom prst="curvedLeftArrow">
+            <a:avLst/>
+          </a:prstGeom>
+        </p:spPr>
+        <p:style>
+          <a:lnRef idx="2">
+            <a:schemeClr val="accent5"/>
+          </a:lnRef>
+          <a:fillRef idx="1">
+            <a:schemeClr val="lt1"/>
+          </a:fillRef>
+          <a:effectRef idx="0">
+            <a:schemeClr val="accent5"/>
+          </a:effectRef>
+          <a:fontRef idx="minor">
+            <a:schemeClr val="dk1"/>
+          </a:fontRef>
+        </p:style>
+        <p:txBody>
+          <a:bodyPr rtlCol="0" anchor="ctr"/>
+          <a:lstStyle/>
+          <a:p>
+            <a:pPr algn="ctr"/>
+            <a:endParaRPr lang="en-US">
+              <a:solidFill>
+                <a:schemeClr val="tx1"/>
+              </a:solidFill>
+            </a:endParaRPr>
           </a:p>
         </p:txBody>
       </p:sp>

</xml_diff>

<commit_message>
Transform of Inst info into JSON
</commit_message>
<xml_diff>
--- a/docs/datascience_poster_v2.pptx
+++ b/docs/datascience_poster_v2.pptx
@@ -3501,8 +3501,8 @@
         </p:blipFill>
         <p:spPr>
           <a:xfrm>
-            <a:off x="1130007" y="551963"/>
-            <a:ext cx="6477000" cy="3714750"/>
+            <a:off x="1130006" y="551963"/>
+            <a:ext cx="7233931" cy="3714750"/>
           </a:xfrm>
           <a:prstGeom prst="rect">
             <a:avLst/>
@@ -3517,7 +3517,7 @@
         </p:nvSpPr>
         <p:spPr>
           <a:xfrm>
-            <a:off x="2639241" y="845972"/>
+            <a:off x="2542989" y="557216"/>
             <a:ext cx="26304677" cy="1461939"/>
           </a:xfrm>
           <a:prstGeom prst="rect">
@@ -3569,7 +3569,7 @@
         </p:blipFill>
         <p:spPr bwMode="auto">
           <a:xfrm>
-            <a:off x="25253416" y="292233"/>
+            <a:off x="25012786" y="292233"/>
             <a:ext cx="3282414" cy="3781341"/>
           </a:xfrm>
           <a:prstGeom prst="rect">
@@ -3609,14 +3609,14 @@
           <p:nvPr>
             <p:extLst>
               <p:ext uri="{D42A27DB-BD31-4B8C-83A1-F6EECF244321}">
-                <p14:modId xmlns:p14="http://schemas.microsoft.com/office/powerpoint/2010/main" val="181372547"/>
+                <p14:modId xmlns:p14="http://schemas.microsoft.com/office/powerpoint/2010/main" val="1189347559"/>
               </p:ext>
             </p:extLst>
           </p:nvPr>
         </p:nvGraphicFramePr>
         <p:xfrm>
           <a:off x="272327" y="4479942"/>
-          <a:ext cx="27685984" cy="2380821"/>
+          <a:ext cx="27685984" cy="1771221"/>
         </p:xfrm>
         <a:graphic>
           <a:graphicData uri="http://schemas.openxmlformats.org/drawingml/2006/table">
@@ -3918,12 +3918,12 @@
                           <a:latin typeface="Trebuchet MS"/>
                           <a:cs typeface="Trebuchet MS"/>
                         </a:rPr>
-                        <a:t>Scott_houde@brown.edu</a:t>
+                        <a:t>scott_houde@brown.edu</a:t>
                       </a:r>
-                    </a:p>
-                    <a:p>
-                      <a:pPr algn="ctr"/>
-                      <a:endParaRPr lang="en-US" sz="4000" dirty="0"/>
+                      <a:endParaRPr lang="en-US" sz="3600" dirty="0" smtClean="0">
+                        <a:latin typeface="Trebuchet MS"/>
+                        <a:cs typeface="Trebuchet MS"/>
+                      </a:endParaRPr>
                     </a:p>
                   </a:txBody>
                   <a:tcPr>
@@ -3983,12 +3983,12 @@
                           <a:latin typeface="Trebuchet MS"/>
                           <a:cs typeface="Trebuchet MS"/>
                         </a:rPr>
-                        <a:t>Johannes_novotny@brown.edu</a:t>
+                        <a:t>johannes_novotny@brown.edu</a:t>
                       </a:r>
-                    </a:p>
-                    <a:p>
-                      <a:pPr algn="ctr"/>
-                      <a:endParaRPr lang="en-US" sz="4000" dirty="0"/>
+                      <a:endParaRPr lang="en-US" sz="3600" dirty="0" smtClean="0">
+                        <a:latin typeface="Trebuchet MS"/>
+                        <a:cs typeface="Trebuchet MS"/>
+                      </a:endParaRPr>
                     </a:p>
                   </a:txBody>
                   <a:tcPr>
@@ -4048,12 +4048,12 @@
                           <a:latin typeface="Trebuchet MS"/>
                           <a:cs typeface="Trebuchet MS"/>
                         </a:rPr>
-                        <a:t>Erfan_zamanian@brown.edu</a:t>
+                        <a:t>erfanz@cs.brown.edu</a:t>
                       </a:r>
-                    </a:p>
-                    <a:p>
-                      <a:pPr algn="ctr"/>
-                      <a:endParaRPr lang="en-US" sz="3600" dirty="0"/>
+                      <a:endParaRPr lang="en-US" sz="3600" dirty="0" smtClean="0">
+                        <a:latin typeface="Trebuchet MS"/>
+                        <a:cs typeface="Trebuchet MS"/>
+                      </a:endParaRPr>
                     </a:p>
                   </a:txBody>
                   <a:tcPr>
@@ -4099,7 +4099,7 @@
         </p:nvCxnSpPr>
         <p:spPr>
           <a:xfrm>
-            <a:off x="230763" y="7018090"/>
+            <a:off x="230763" y="6332290"/>
             <a:ext cx="27708457" cy="0"/>
           </a:xfrm>
           <a:prstGeom prst="line">
@@ -4129,7 +4129,7 @@
         </p:nvSpPr>
         <p:spPr>
           <a:xfrm>
-            <a:off x="272327" y="7309038"/>
+            <a:off x="272327" y="6527988"/>
             <a:ext cx="27794629" cy="1938992"/>
           </a:xfrm>
           <a:prstGeom prst="rect">
@@ -4163,7 +4163,7 @@
         </p:nvSpPr>
         <p:spPr>
           <a:xfrm>
-            <a:off x="452985" y="9725881"/>
+            <a:off x="452985" y="8944831"/>
             <a:ext cx="8607888" cy="8201891"/>
           </a:xfrm>
           <a:prstGeom prst="roundRect">
@@ -4201,7 +4201,7 @@
         </p:nvSpPr>
         <p:spPr>
           <a:xfrm>
-            <a:off x="9953264" y="9878281"/>
+            <a:off x="9953264" y="9097231"/>
             <a:ext cx="8607888" cy="8201891"/>
           </a:xfrm>
           <a:prstGeom prst="roundRect">
@@ -4239,7 +4239,7 @@
         </p:nvSpPr>
         <p:spPr>
           <a:xfrm>
-            <a:off x="19527183" y="9795153"/>
+            <a:off x="19527183" y="9014103"/>
             <a:ext cx="8607888" cy="8201891"/>
           </a:xfrm>
           <a:prstGeom prst="roundRect">
@@ -4277,7 +4277,7 @@
         </p:nvSpPr>
         <p:spPr>
           <a:xfrm>
-            <a:off x="965201" y="9933694"/>
+            <a:off x="965201" y="9152644"/>
             <a:ext cx="7661336" cy="923330"/>
           </a:xfrm>
           <a:prstGeom prst="rect">
@@ -4316,7 +4316,7 @@
         </p:nvSpPr>
         <p:spPr>
           <a:xfrm>
-            <a:off x="19753116" y="9920050"/>
+            <a:off x="19753116" y="9139000"/>
             <a:ext cx="8299704" cy="1569660"/>
           </a:xfrm>
           <a:prstGeom prst="rect">
@@ -4355,7 +4355,7 @@
         </p:nvSpPr>
         <p:spPr>
           <a:xfrm>
-            <a:off x="10531347" y="10086094"/>
+            <a:off x="10531347" y="9305044"/>
             <a:ext cx="7344121" cy="923330"/>
           </a:xfrm>
           <a:prstGeom prst="rect">
@@ -4386,7 +4386,7 @@
         </p:nvSpPr>
         <p:spPr>
           <a:xfrm>
-            <a:off x="8977745" y="15780317"/>
+            <a:off x="8977745" y="14999267"/>
             <a:ext cx="1022737" cy="2826327"/>
           </a:xfrm>
           <a:prstGeom prst="downArrow">
@@ -4442,7 +4442,7 @@
         </p:nvSpPr>
         <p:spPr>
           <a:xfrm>
-            <a:off x="18603472" y="15780317"/>
+            <a:off x="18603472" y="14999267"/>
             <a:ext cx="1022737" cy="2826327"/>
           </a:xfrm>
           <a:prstGeom prst="downArrow">
@@ -4494,7 +4494,7 @@
         </p:nvSpPr>
         <p:spPr>
           <a:xfrm>
-            <a:off x="498760" y="18612006"/>
+            <a:off x="498760" y="17926206"/>
             <a:ext cx="27568196" cy="6076794"/>
           </a:xfrm>
           <a:prstGeom prst="roundRect">
@@ -4532,7 +4532,7 @@
         </p:nvSpPr>
         <p:spPr>
           <a:xfrm>
-            <a:off x="11600886" y="16379548"/>
+            <a:off x="11600886" y="15598498"/>
             <a:ext cx="6919458" cy="1548224"/>
           </a:xfrm>
           <a:prstGeom prst="rightArrow">
@@ -4578,7 +4578,7 @@
         </p:nvSpPr>
         <p:spPr>
           <a:xfrm>
-            <a:off x="10032578" y="15383162"/>
+            <a:off x="10032578" y="14602112"/>
             <a:ext cx="6996520" cy="1533238"/>
           </a:xfrm>
           <a:prstGeom prst="leftArrow">
@@ -4619,7 +4619,7 @@
         </p:nvSpPr>
         <p:spPr>
           <a:xfrm>
-            <a:off x="498760" y="10884731"/>
+            <a:off x="498760" y="10103681"/>
             <a:ext cx="8478985" cy="4895586"/>
           </a:xfrm>
           <a:prstGeom prst="roundRect">
@@ -4709,7 +4709,7 @@
         </p:nvSpPr>
         <p:spPr>
           <a:xfrm>
-            <a:off x="10118764" y="11045114"/>
+            <a:off x="10118764" y="10264064"/>
             <a:ext cx="8337974" cy="4421188"/>
           </a:xfrm>
           <a:prstGeom prst="roundRect">
@@ -4811,7 +4811,7 @@
         </p:nvSpPr>
         <p:spPr>
           <a:xfrm>
-            <a:off x="19700520" y="11540509"/>
+            <a:off x="19700520" y="10759459"/>
             <a:ext cx="8238699" cy="5670779"/>
           </a:xfrm>
           <a:prstGeom prst="roundRect">
@@ -4900,7 +4900,7 @@
         </p:blipFill>
         <p:spPr bwMode="auto">
           <a:xfrm>
-            <a:off x="1230776" y="16219402"/>
+            <a:off x="1230776" y="15438352"/>
             <a:ext cx="1381171" cy="1208525"/>
           </a:xfrm>
           <a:prstGeom prst="rect">
@@ -4926,7 +4926,7 @@
         </p:nvSpPr>
         <p:spPr>
           <a:xfrm>
-            <a:off x="2813753" y="16320234"/>
+            <a:off x="2813753" y="15539184"/>
             <a:ext cx="5550185" cy="1006862"/>
           </a:xfrm>
           <a:prstGeom prst="roundRect">
@@ -4953,14 +4953,14 @@
           <a:p>
             <a:pPr algn="ctr"/>
             <a:r>
-              <a:rPr lang="en-US" sz="3600" dirty="0" smtClean="0"/>
+              <a:rPr lang="en-US" sz="2800" dirty="0" smtClean="0"/>
               <a:t>Entity resolution was </a:t>
             </a:r>
             <a:r>
-              <a:rPr lang="en-US" sz="3600" dirty="0" smtClean="0"/>
-              <a:t>tricky!</a:t>
-            </a:r>
-            <a:endParaRPr lang="en-US" sz="3600" dirty="0"/>
+              <a:rPr lang="en-US" sz="2800" dirty="0" smtClean="0"/>
+              <a:t>tricky and not all professors were in the dataset!</a:t>
+            </a:r>
+            <a:endParaRPr lang="en-US" sz="2800" dirty="0"/>
           </a:p>
         </p:txBody>
       </p:sp>
@@ -4973,7 +4973,7 @@
           <p:nvPr>
             <p:extLst>
               <p:ext uri="{D42A27DB-BD31-4B8C-83A1-F6EECF244321}">
-                <p14:modId xmlns:p14="http://schemas.microsoft.com/office/powerpoint/2010/main" val="1886508150"/>
+                <p14:modId xmlns:p14="http://schemas.microsoft.com/office/powerpoint/2010/main" val="1412994546"/>
               </p:ext>
             </p:extLst>
           </p:nvPr>
@@ -5000,7 +5000,23 @@
                     <a:p>
                       <a:r>
                         <a:rPr lang="en-US" sz="2400" dirty="0" smtClean="0"/>
-                        <a:t>1) </a:t>
+                        <a:t>1)</a:t>
+                      </a:r>
+                      <a:r>
+                        <a:rPr lang="en-US" sz="400" dirty="0" smtClean="0"/>
+                        <a:t> </a:t>
+                      </a:r>
+                      <a:r>
+                        <a:rPr lang="en-US" sz="2400" b="0" i="0" u="none" strike="noStrike" kern="1200" dirty="0" err="1" smtClean="0">
+                          <a:solidFill>
+                            <a:schemeClr val="tx1"/>
+                          </a:solidFill>
+                          <a:effectLst/>
+                          <a:latin typeface="+mn-lt"/>
+                          <a:ea typeface="+mn-ea"/>
+                          <a:cs typeface="+mn-cs"/>
+                        </a:rPr>
+                        <a:t>Jie</a:t>
                       </a:r>
                       <a:r>
                         <a:rPr lang="en-US" sz="2400" b="0" i="0" u="none" strike="noStrike" kern="1200" dirty="0" smtClean="0">
@@ -5012,9 +5028,155 @@
                           <a:ea typeface="+mn-ea"/>
                           <a:cs typeface="+mn-cs"/>
                         </a:rPr>
-                        <a:t>Citation Network Dataset is   [Tang et al] as of May 25, 2014</a:t>
+                        <a:t> Tang, Jing Zhang, </a:t>
                       </a:r>
-                      <a:endParaRPr lang="en-US" sz="2400" dirty="0"/>
+                      <a:r>
+                        <a:rPr lang="en-US" sz="2400" b="0" i="0" u="none" strike="noStrike" kern="1200" dirty="0" err="1" smtClean="0">
+                          <a:solidFill>
+                            <a:schemeClr val="tx1"/>
+                          </a:solidFill>
+                          <a:effectLst/>
+                          <a:latin typeface="+mn-lt"/>
+                          <a:ea typeface="+mn-ea"/>
+                          <a:cs typeface="+mn-cs"/>
+                        </a:rPr>
+                        <a:t>Limin</a:t>
+                      </a:r>
+                      <a:r>
+                        <a:rPr lang="en-US" sz="2400" b="0" i="0" u="none" strike="noStrike" kern="1200" dirty="0" smtClean="0">
+                          <a:solidFill>
+                            <a:schemeClr val="tx1"/>
+                          </a:solidFill>
+                          <a:effectLst/>
+                          <a:latin typeface="+mn-lt"/>
+                          <a:ea typeface="+mn-ea"/>
+                          <a:cs typeface="+mn-cs"/>
+                        </a:rPr>
+                        <a:t> Yao, </a:t>
+                      </a:r>
+                      <a:r>
+                        <a:rPr lang="en-US" sz="2400" b="0" i="0" u="none" strike="noStrike" kern="1200" dirty="0" err="1" smtClean="0">
+                          <a:solidFill>
+                            <a:schemeClr val="tx1"/>
+                          </a:solidFill>
+                          <a:effectLst/>
+                          <a:latin typeface="+mn-lt"/>
+                          <a:ea typeface="+mn-ea"/>
+                          <a:cs typeface="+mn-cs"/>
+                        </a:rPr>
+                        <a:t>Juanzi</a:t>
+                      </a:r>
+                      <a:r>
+                        <a:rPr lang="en-US" sz="2400" b="0" i="0" u="none" strike="noStrike" kern="1200" dirty="0" smtClean="0">
+                          <a:solidFill>
+                            <a:schemeClr val="tx1"/>
+                          </a:solidFill>
+                          <a:effectLst/>
+                          <a:latin typeface="+mn-lt"/>
+                          <a:ea typeface="+mn-ea"/>
+                          <a:cs typeface="+mn-cs"/>
+                        </a:rPr>
+                        <a:t> Li, Li Zhang, and </a:t>
+                      </a:r>
+                      <a:r>
+                        <a:rPr lang="en-US" sz="2400" b="0" i="0" u="none" strike="noStrike" kern="1200" dirty="0" err="1" smtClean="0">
+                          <a:solidFill>
+                            <a:schemeClr val="tx1"/>
+                          </a:solidFill>
+                          <a:effectLst/>
+                          <a:latin typeface="+mn-lt"/>
+                          <a:ea typeface="+mn-ea"/>
+                          <a:cs typeface="+mn-cs"/>
+                        </a:rPr>
+                        <a:t>Zhong</a:t>
+                      </a:r>
+                      <a:r>
+                        <a:rPr lang="en-US" sz="2400" b="0" i="0" u="none" strike="noStrike" kern="1200" dirty="0" smtClean="0">
+                          <a:solidFill>
+                            <a:schemeClr val="tx1"/>
+                          </a:solidFill>
+                          <a:effectLst/>
+                          <a:latin typeface="+mn-lt"/>
+                          <a:ea typeface="+mn-ea"/>
+                          <a:cs typeface="+mn-cs"/>
+                        </a:rPr>
+                        <a:t> Su. </a:t>
+                      </a:r>
+                      <a:r>
+                        <a:rPr lang="en-US" sz="2400" b="0" i="0" u="none" strike="noStrike" kern="1200" dirty="0" err="1" smtClean="0">
+                          <a:solidFill>
+                            <a:schemeClr val="tx1"/>
+                          </a:solidFill>
+                          <a:effectLst/>
+                          <a:latin typeface="+mn-lt"/>
+                          <a:ea typeface="+mn-ea"/>
+                          <a:cs typeface="+mn-cs"/>
+                        </a:rPr>
+                        <a:t>ArnetMiner</a:t>
+                      </a:r>
+                      <a:r>
+                        <a:rPr lang="en-US" sz="2400" b="0" i="0" u="none" strike="noStrike" kern="1200" dirty="0" smtClean="0">
+                          <a:solidFill>
+                            <a:schemeClr val="tx1"/>
+                          </a:solidFill>
+                          <a:effectLst/>
+                          <a:latin typeface="+mn-lt"/>
+                          <a:ea typeface="+mn-ea"/>
+                          <a:cs typeface="+mn-cs"/>
+                        </a:rPr>
+                        <a:t>: Extraction and Mining of Academic Social Networks. In </a:t>
+                      </a:r>
+                      <a:r>
+                        <a:rPr lang="en-US" sz="2400" b="0" i="1" u="sng" strike="noStrike" kern="1200" dirty="0" smtClean="0">
+                          <a:solidFill>
+                            <a:schemeClr val="tx1"/>
+                          </a:solidFill>
+                          <a:effectLst/>
+                          <a:latin typeface="+mn-lt"/>
+                          <a:ea typeface="+mn-ea"/>
+                          <a:cs typeface="+mn-cs"/>
+                          <a:hlinkClick r:id="rId5"/>
+                        </a:rPr>
+                        <a:t>Proceedings of the Fourteenth ACM SIGKDD International Conference on Knowledge Discovery and Data Mining</a:t>
+                      </a:r>
+                      <a:r>
+                        <a:rPr lang="en-US" sz="2400" b="0" i="0" u="none" strike="noStrike" kern="1200" dirty="0" smtClean="0">
+                          <a:solidFill>
+                            <a:schemeClr val="tx1"/>
+                          </a:solidFill>
+                          <a:effectLst/>
+                          <a:latin typeface="+mn-lt"/>
+                          <a:ea typeface="+mn-ea"/>
+                          <a:cs typeface="+mn-cs"/>
+                        </a:rPr>
+                        <a:t> (</a:t>
+                      </a:r>
+                      <a:r>
+                        <a:rPr lang="en-US" sz="2400" b="0" i="0" u="sng" strike="noStrike" kern="1200" dirty="0" smtClean="0">
+                          <a:solidFill>
+                            <a:schemeClr val="tx1"/>
+                          </a:solidFill>
+                          <a:effectLst/>
+                          <a:latin typeface="+mn-lt"/>
+                          <a:ea typeface="+mn-ea"/>
+                          <a:cs typeface="+mn-cs"/>
+                          <a:hlinkClick r:id="rId5"/>
+                        </a:rPr>
+                        <a:t>SIGKDD'2008</a:t>
+                      </a:r>
+                      <a:r>
+                        <a:rPr lang="en-US" sz="2400" b="0" i="0" u="none" strike="noStrike" kern="1200" dirty="0" smtClean="0">
+                          <a:solidFill>
+                            <a:schemeClr val="tx1"/>
+                          </a:solidFill>
+                          <a:effectLst/>
+                          <a:latin typeface="+mn-lt"/>
+                          <a:ea typeface="+mn-ea"/>
+                          <a:cs typeface="+mn-cs"/>
+                        </a:rPr>
+                        <a:t>). pp.990-998.</a:t>
+                      </a:r>
+                      <a:endParaRPr lang="en-US" sz="400" dirty="0"/>
                     </a:p>
                   </a:txBody>
                   <a:tcPr marL="0" marR="0" marT="0" marB="0" anchor="ctr"/>
@@ -5062,13 +5224,12 @@
                         <a:t>Analysis of Over 2,000 Computer Science Professors at Top Universities , </a:t>
                       </a:r>
                       <a:r>
-                        <a:rPr lang="en-US" sz="2000" dirty="0" smtClean="0"/>
+                        <a:rPr lang="en-US" sz="2000" dirty="0" smtClean="0">
+                          <a:hlinkClick r:id="rId6"/>
+                        </a:rPr>
                         <a:t>http://jeffhuang.com/computer_science_professors.html</a:t>
                       </a:r>
-                    </a:p>
-                    <a:p>
-                      <a:pPr algn="l"/>
-                      <a:endParaRPr lang="en-US" sz="2400" dirty="0"/>
+                      <a:endParaRPr lang="en-US" sz="2000" dirty="0" smtClean="0"/>
                     </a:p>
                   </a:txBody>
                   <a:tcPr marL="0" marR="0" marT="0" marB="0" anchor="ctr"/>
@@ -5090,7 +5251,7 @@
                       </a:r>
                       <a:r>
                         <a:rPr lang="en-US" sz="2400" dirty="0" smtClean="0">
-                          <a:hlinkClick r:id="rId5"/>
+                          <a:hlinkClick r:id="rId7"/>
                         </a:rPr>
                         <a:t>http://www.pesc.org/interior.php?page_id=145</a:t>
                       </a:r>
@@ -5115,7 +5276,13 @@
                       </a:r>
                       <a:r>
                         <a:rPr lang="en-US" sz="2400" dirty="0" smtClean="0"/>
-                        <a:t>, http://nces.ed.gov/ipeds/datacenter/DataFiles.aspx</a:t>
+                        <a:t>, </a:t>
+                      </a:r>
+                      <a:r>
+                        <a:rPr lang="en-US" sz="2400" dirty="0" smtClean="0">
+                          <a:hlinkClick r:id="rId8"/>
+                        </a:rPr>
+                        <a:t>http://nces.ed.gov/ipeds/datacenter/DataFiles.aspx</a:t>
                       </a:r>
                       <a:endParaRPr lang="en-US" sz="2400" dirty="0"/>
                     </a:p>
@@ -5181,7 +5348,7 @@
         </p:nvSpPr>
         <p:spPr>
           <a:xfrm>
-            <a:off x="10412930" y="18623230"/>
+            <a:off x="10412930" y="17842180"/>
             <a:ext cx="7344121" cy="1015663"/>
           </a:xfrm>
           <a:prstGeom prst="rect">
@@ -5212,7 +5379,7 @@
         </p:nvSpPr>
         <p:spPr>
           <a:xfrm>
-            <a:off x="19267240" y="19496442"/>
+            <a:off x="19267240" y="18810642"/>
             <a:ext cx="8251256" cy="1511595"/>
           </a:xfrm>
           <a:prstGeom prst="flowChartInternalStorage">
@@ -5254,7 +5421,7 @@
         </p:nvSpPr>
         <p:spPr>
           <a:xfrm>
-            <a:off x="19267240" y="21241256"/>
+            <a:off x="19267240" y="20555456"/>
             <a:ext cx="8251256" cy="1511595"/>
           </a:xfrm>
           <a:prstGeom prst="flowChartInternalStorage">
@@ -5296,7 +5463,7 @@
         </p:nvSpPr>
         <p:spPr>
           <a:xfrm>
-            <a:off x="19267240" y="22950226"/>
+            <a:off x="19267240" y="22264426"/>
             <a:ext cx="8251256" cy="1511595"/>
           </a:xfrm>
           <a:prstGeom prst="flowChartInternalStorage">
@@ -5338,7 +5505,7 @@
         </p:nvSpPr>
         <p:spPr>
           <a:xfrm>
-            <a:off x="20014130" y="18724830"/>
+            <a:off x="20014130" y="17943780"/>
             <a:ext cx="7344121" cy="769441"/>
           </a:xfrm>
           <a:prstGeom prst="rect">
@@ -5369,7 +5536,7 @@
         </p:nvSpPr>
         <p:spPr>
           <a:xfrm>
-            <a:off x="10966668" y="20617792"/>
+            <a:off x="10966668" y="19931992"/>
             <a:ext cx="6908800" cy="3269744"/>
           </a:xfrm>
           <a:prstGeom prst="flowChartInternalStorage">
@@ -5422,7 +5589,7 @@
         </p:nvCxnSpPr>
         <p:spPr>
           <a:xfrm rot="10800000" flipV="1">
-            <a:off x="17875468" y="20252240"/>
+            <a:off x="17875468" y="19566440"/>
             <a:ext cx="1391772" cy="2000424"/>
           </a:xfrm>
           <a:prstGeom prst="bentConnector3">
@@ -5458,7 +5625,7 @@
         </p:nvCxnSpPr>
         <p:spPr>
           <a:xfrm rot="10800000" flipV="1">
-            <a:off x="17875468" y="21997054"/>
+            <a:off x="17875468" y="21311254"/>
             <a:ext cx="1391772" cy="255610"/>
           </a:xfrm>
           <a:prstGeom prst="bentConnector3">
@@ -5494,7 +5661,7 @@
         </p:nvCxnSpPr>
         <p:spPr>
           <a:xfrm rot="10800000">
-            <a:off x="17875468" y="22252664"/>
+            <a:off x="17875468" y="21566864"/>
             <a:ext cx="1391772" cy="1453360"/>
           </a:xfrm>
           <a:prstGeom prst="bentConnector3">
@@ -5527,7 +5694,7 @@
         </p:nvSpPr>
         <p:spPr>
           <a:xfrm>
-            <a:off x="1003015" y="19138479"/>
+            <a:off x="1003015" y="18452679"/>
             <a:ext cx="7956258" cy="4940722"/>
           </a:xfrm>
           <a:prstGeom prst="flowChartInternalStorage">
@@ -5585,7 +5752,7 @@
         </p:nvSpPr>
         <p:spPr>
           <a:xfrm>
-            <a:off x="3982153" y="19029630"/>
+            <a:off x="3982153" y="18343830"/>
             <a:ext cx="4793254" cy="830997"/>
           </a:xfrm>
           <a:prstGeom prst="rect">
@@ -5618,7 +5785,7 @@
         </p:nvCxnSpPr>
         <p:spPr>
           <a:xfrm>
-            <a:off x="8959273" y="21608840"/>
+            <a:off x="8959273" y="20923040"/>
             <a:ext cx="2007395" cy="643824"/>
           </a:xfrm>
           <a:prstGeom prst="bentConnector3">
@@ -5648,8 +5815,8 @@
         </p:nvSpPr>
         <p:spPr>
           <a:xfrm>
-            <a:off x="272327" y="24975448"/>
-            <a:ext cx="27921946" cy="11549751"/>
+            <a:off x="272327" y="24251548"/>
+            <a:ext cx="27921946" cy="12286352"/>
           </a:xfrm>
           <a:prstGeom prst="roundRect">
             <a:avLst/>
@@ -5686,7 +5853,7 @@
         </p:nvSpPr>
         <p:spPr>
           <a:xfrm>
-            <a:off x="8800428" y="24959188"/>
+            <a:off x="8800428" y="24235288"/>
             <a:ext cx="11241282" cy="1015663"/>
           </a:xfrm>
           <a:prstGeom prst="rect">
@@ -5720,8 +5887,8 @@
         </p:nvSpPr>
         <p:spPr>
           <a:xfrm>
-            <a:off x="648680" y="26210070"/>
-            <a:ext cx="10317988" cy="9975161"/>
+            <a:off x="648680" y="25486170"/>
+            <a:ext cx="11089534" cy="9975161"/>
           </a:xfrm>
           <a:prstGeom prst="roundRect">
             <a:avLst/>
@@ -5758,7 +5925,7 @@
         </p:nvSpPr>
         <p:spPr>
           <a:xfrm>
-            <a:off x="15089444" y="26280376"/>
+            <a:off x="15089444" y="25556476"/>
             <a:ext cx="9753599" cy="4736798"/>
           </a:xfrm>
           <a:prstGeom prst="roundRect">
@@ -5796,7 +5963,7 @@
         </p:nvSpPr>
         <p:spPr>
           <a:xfrm>
-            <a:off x="15060615" y="31521571"/>
+            <a:off x="15060615" y="30797671"/>
             <a:ext cx="9753599" cy="4736798"/>
           </a:xfrm>
           <a:prstGeom prst="roundRect">
@@ -5834,7 +6001,7 @@
         </p:nvSpPr>
         <p:spPr>
           <a:xfrm>
-            <a:off x="4469435" y="26083276"/>
+            <a:off x="4469435" y="25359376"/>
             <a:ext cx="3942561" cy="769441"/>
           </a:xfrm>
           <a:prstGeom prst="rect">
@@ -5864,7 +6031,7 @@
         </p:nvSpPr>
         <p:spPr>
           <a:xfrm>
-            <a:off x="17875468" y="26412656"/>
+            <a:off x="17875468" y="25688756"/>
             <a:ext cx="5530562" cy="769441"/>
           </a:xfrm>
           <a:prstGeom prst="rect">
@@ -5894,7 +6061,7 @@
         </p:nvSpPr>
         <p:spPr>
           <a:xfrm>
-            <a:off x="18284587" y="31572241"/>
+            <a:off x="18284587" y="30848341"/>
             <a:ext cx="5530562" cy="769441"/>
           </a:xfrm>
           <a:prstGeom prst="rect">
@@ -5924,25 +6091,27 @@
           </p:cNvPicPr>
           <p:nvPr/>
         </p:nvPicPr>
-        <p:blipFill>
-          <a:blip r:embed="rId6">
+        <p:blipFill rotWithShape="1">
+          <a:blip r:embed="rId9">
             <a:extLst>
               <a:ext uri="{28A0092B-C50C-407E-A947-70E740481C1C}">
                 <a14:useLocalDpi xmlns:a14="http://schemas.microsoft.com/office/drawing/2010/main" val="0"/>
               </a:ext>
             </a:extLst>
           </a:blip>
-          <a:stretch>
-            <a:fillRect/>
-          </a:stretch>
+          <a:srcRect b="44221"/>
+          <a:stretch/>
         </p:blipFill>
         <p:spPr>
           <a:xfrm>
-            <a:off x="11596755" y="28981665"/>
-            <a:ext cx="2816911" cy="6955336"/>
-          </a:xfrm>
-          <a:prstGeom prst="rect">
-            <a:avLst/>
+            <a:off x="886226" y="25550363"/>
+            <a:ext cx="2816911" cy="3879585"/>
+          </a:xfrm>
+          <a:prstGeom prst="round2DiagRect">
+            <a:avLst>
+              <a:gd name="adj1" fmla="val 50000"/>
+              <a:gd name="adj2" fmla="val 0"/>
+            </a:avLst>
           </a:prstGeom>
         </p:spPr>
       </p:pic>
@@ -5954,8 +6123,8 @@
         </p:nvSpPr>
         <p:spPr>
           <a:xfrm>
-            <a:off x="11159172" y="26804592"/>
-            <a:ext cx="3820755" cy="1638064"/>
+            <a:off x="12040095" y="25981714"/>
+            <a:ext cx="2747328" cy="1638064"/>
           </a:xfrm>
           <a:prstGeom prst="rightArrow">
             <a:avLst/>
@@ -5991,8 +6160,8 @@
           <p:nvPr/>
         </p:nvSpPr>
         <p:spPr>
-          <a:xfrm>
-            <a:off x="24843043" y="28442656"/>
+          <a:xfrm flipH="1">
+            <a:off x="12033801" y="28367603"/>
             <a:ext cx="2675453" cy="5871407"/>
           </a:xfrm>
           <a:prstGeom prst="curvedLeftArrow">
@@ -6026,6 +6195,36 @@
           </a:p>
         </p:txBody>
       </p:sp>
+      <p:pic>
+        <p:nvPicPr>
+          <p:cNvPr id="285" name="Picture 284"/>
+          <p:cNvPicPr>
+            <a:picLocks noChangeAspect="1"/>
+          </p:cNvPicPr>
+          <p:nvPr/>
+        </p:nvPicPr>
+        <p:blipFill>
+          <a:blip r:embed="rId10">
+            <a:extLst>
+              <a:ext uri="{28A0092B-C50C-407E-A947-70E740481C1C}">
+                <a14:useLocalDpi xmlns:a14="http://schemas.microsoft.com/office/drawing/2010/main" val="0"/>
+              </a:ext>
+            </a:extLst>
+          </a:blip>
+          <a:stretch>
+            <a:fillRect/>
+          </a:stretch>
+        </p:blipFill>
+        <p:spPr>
+          <a:xfrm>
+            <a:off x="25261979" y="32673168"/>
+            <a:ext cx="2490945" cy="2692913"/>
+          </a:xfrm>
+          <a:prstGeom prst="rect">
+            <a:avLst/>
+          </a:prstGeom>
+        </p:spPr>
+      </p:pic>
     </p:spTree>
     <p:extLst>
       <p:ext uri="{BB962C8B-B14F-4D97-AF65-F5344CB8AC3E}">

</xml_diff>

<commit_message>
report and JSON stuff
</commit_message>
<xml_diff>
--- a/docs/datascience_poster_v2.pptx
+++ b/docs/datascience_poster_v2.pptx
@@ -4973,7 +4973,7 @@
           <p:nvPr>
             <p:extLst>
               <p:ext uri="{D42A27DB-BD31-4B8C-83A1-F6EECF244321}">
-                <p14:modId xmlns:p14="http://schemas.microsoft.com/office/powerpoint/2010/main" val="1412994546"/>
+                <p14:modId xmlns:p14="http://schemas.microsoft.com/office/powerpoint/2010/main" val="2480757156"/>
               </p:ext>
             </p:extLst>
           </p:nvPr>
@@ -5268,15 +5268,7 @@
                       <a:pPr algn="l"/>
                       <a:r>
                         <a:rPr lang="en-US" sz="2400" dirty="0" smtClean="0"/>
-                        <a:t>4) National Center of Education </a:t>
-                      </a:r>
-                      <a:r>
-                        <a:rPr lang="en-US" sz="2400" dirty="0" err="1" smtClean="0"/>
-                        <a:t>Statisics</a:t>
-                      </a:r>
-                      <a:r>
-                        <a:rPr lang="en-US" sz="2400" dirty="0" smtClean="0"/>
-                        <a:t>, </a:t>
+                        <a:t>4) National Center of Education Statistics, </a:t>
                       </a:r>
                       <a:r>
                         <a:rPr lang="en-US" sz="2400" dirty="0" smtClean="0">
@@ -5888,7 +5880,7 @@
         <p:spPr>
           <a:xfrm>
             <a:off x="648680" y="25486170"/>
-            <a:ext cx="11089534" cy="9975161"/>
+            <a:ext cx="12552970" cy="10827154"/>
           </a:xfrm>
           <a:prstGeom prst="roundRect">
             <a:avLst/>
@@ -5925,8 +5917,8 @@
         </p:nvSpPr>
         <p:spPr>
           <a:xfrm>
-            <a:off x="15089444" y="25556476"/>
-            <a:ext cx="9753599" cy="4736798"/>
+            <a:off x="16665741" y="25386045"/>
+            <a:ext cx="10692509" cy="5293908"/>
           </a:xfrm>
           <a:prstGeom prst="roundRect">
             <a:avLst/>
@@ -5963,8 +5955,8 @@
         </p:nvSpPr>
         <p:spPr>
           <a:xfrm>
-            <a:off x="15060615" y="30797671"/>
-            <a:ext cx="9753599" cy="4736798"/>
+            <a:off x="16665741" y="30776688"/>
+            <a:ext cx="10692509" cy="5536636"/>
           </a:xfrm>
           <a:prstGeom prst="roundRect">
             <a:avLst/>
@@ -5995,14 +5987,14 @@
       </p:sp>
       <p:sp>
         <p:nvSpPr>
-          <p:cNvPr id="57" name="TextBox 56"/>
+          <p:cNvPr id="211" name="TextBox 210"/>
           <p:cNvSpPr txBox="1"/>
           <p:nvPr/>
         </p:nvSpPr>
         <p:spPr>
           <a:xfrm>
-            <a:off x="4469435" y="25359376"/>
-            <a:ext cx="3942561" cy="769441"/>
+            <a:off x="19876863" y="25375360"/>
+            <a:ext cx="6062950" cy="646331"/>
           </a:xfrm>
           <a:prstGeom prst="rect">
             <a:avLst/>
@@ -6016,23 +6008,23 @@
           <a:lstStyle/>
           <a:p>
             <a:r>
-              <a:rPr lang="en-US" sz="4400" u="sng" dirty="0" smtClean="0"/>
-              <a:t>Main Page</a:t>
-            </a:r>
-            <a:endParaRPr lang="en-US" sz="6600" u="sng" dirty="0"/>
-          </a:p>
-        </p:txBody>
-      </p:sp>
-      <p:sp>
-        <p:nvSpPr>
-          <p:cNvPr id="211" name="TextBox 210"/>
+              <a:rPr lang="en-US" sz="3600" u="sng" dirty="0" smtClean="0"/>
+              <a:t>Search Results</a:t>
+            </a:r>
+            <a:endParaRPr lang="en-US" sz="5400" u="sng" dirty="0"/>
+          </a:p>
+        </p:txBody>
+      </p:sp>
+      <p:sp>
+        <p:nvSpPr>
+          <p:cNvPr id="212" name="TextBox 211"/>
           <p:cNvSpPr txBox="1"/>
           <p:nvPr/>
         </p:nvSpPr>
         <p:spPr>
           <a:xfrm>
-            <a:off x="17875468" y="25688756"/>
-            <a:ext cx="5530562" cy="769441"/>
+            <a:off x="20409251" y="30866717"/>
+            <a:ext cx="5530562" cy="646331"/>
           </a:xfrm>
           <a:prstGeom prst="rect">
             <a:avLst/>
@@ -6046,75 +6038,13 @@
           <a:lstStyle/>
           <a:p>
             <a:r>
-              <a:rPr lang="en-US" sz="4400" u="sng" dirty="0" smtClean="0"/>
-              <a:t>Search Results</a:t>
-            </a:r>
-            <a:endParaRPr lang="en-US" sz="6600" u="sng" dirty="0"/>
-          </a:p>
-        </p:txBody>
-      </p:sp>
-      <p:sp>
-        <p:nvSpPr>
-          <p:cNvPr id="212" name="TextBox 211"/>
-          <p:cNvSpPr txBox="1"/>
-          <p:nvPr/>
-        </p:nvSpPr>
-        <p:spPr>
-          <a:xfrm>
-            <a:off x="18284587" y="30848341"/>
-            <a:ext cx="5530562" cy="769441"/>
-          </a:xfrm>
-          <a:prstGeom prst="rect">
-            <a:avLst/>
-          </a:prstGeom>
-          <a:noFill/>
-        </p:spPr>
-        <p:txBody>
-          <a:bodyPr wrap="square" rtlCol="0">
-            <a:spAutoFit/>
-          </a:bodyPr>
-          <a:lstStyle/>
-          <a:p>
-            <a:r>
-              <a:rPr lang="en-US" sz="4400" u="sng" dirty="0" smtClean="0"/>
+              <a:rPr lang="en-US" sz="3600" u="sng" dirty="0" smtClean="0"/>
               <a:t>Faculty Detail</a:t>
             </a:r>
-            <a:endParaRPr lang="en-US" sz="6600" u="sng" dirty="0"/>
-          </a:p>
-        </p:txBody>
-      </p:sp>
-      <p:pic>
-        <p:nvPicPr>
-          <p:cNvPr id="58" name="Picture 57"/>
-          <p:cNvPicPr>
-            <a:picLocks noChangeAspect="1"/>
-          </p:cNvPicPr>
-          <p:nvPr/>
-        </p:nvPicPr>
-        <p:blipFill rotWithShape="1">
-          <a:blip r:embed="rId9">
-            <a:extLst>
-              <a:ext uri="{28A0092B-C50C-407E-A947-70E740481C1C}">
-                <a14:useLocalDpi xmlns:a14="http://schemas.microsoft.com/office/drawing/2010/main" val="0"/>
-              </a:ext>
-            </a:extLst>
-          </a:blip>
-          <a:srcRect b="44221"/>
-          <a:stretch/>
-        </p:blipFill>
-        <p:spPr>
-          <a:xfrm>
-            <a:off x="886226" y="25550363"/>
-            <a:ext cx="2816911" cy="3879585"/>
-          </a:xfrm>
-          <a:prstGeom prst="round2DiagRect">
-            <a:avLst>
-              <a:gd name="adj1" fmla="val 50000"/>
-              <a:gd name="adj2" fmla="val 0"/>
-            </a:avLst>
-          </a:prstGeom>
-        </p:spPr>
-      </p:pic>
+            <a:endParaRPr lang="en-US" sz="5400" u="sng" dirty="0"/>
+          </a:p>
+        </p:txBody>
+      </p:sp>
       <p:sp>
         <p:nvSpPr>
           <p:cNvPr id="260" name="Right Arrow 259"/>
@@ -6123,7 +6053,7 @@
         </p:nvSpPr>
         <p:spPr>
           <a:xfrm>
-            <a:off x="12040095" y="25981714"/>
+            <a:off x="13784712" y="26634003"/>
             <a:ext cx="2747328" cy="1638064"/>
           </a:xfrm>
           <a:prstGeom prst="rightArrow">
@@ -6161,8 +6091,8 @@
         </p:nvSpPr>
         <p:spPr>
           <a:xfrm flipH="1">
-            <a:off x="12033801" y="28367603"/>
-            <a:ext cx="2675453" cy="5871407"/>
+            <a:off x="13722885" y="29191774"/>
+            <a:ext cx="2675453" cy="4182871"/>
           </a:xfrm>
           <a:prstGeom prst="curvedLeftArrow">
             <a:avLst/>
@@ -6204,7 +6134,7 @@
           <p:nvPr/>
         </p:nvPicPr>
         <p:blipFill>
-          <a:blip r:embed="rId10">
+          <a:blip r:embed="rId9">
             <a:extLst>
               <a:ext uri="{28A0092B-C50C-407E-A947-70E740481C1C}">
                 <a14:useLocalDpi xmlns:a14="http://schemas.microsoft.com/office/drawing/2010/main" val="0"/>
@@ -6217,8 +6147,157 @@
         </p:blipFill>
         <p:spPr>
           <a:xfrm>
-            <a:off x="25261979" y="32673168"/>
+            <a:off x="14257208" y="33609816"/>
             <a:ext cx="2490945" cy="2692913"/>
+          </a:xfrm>
+          <a:prstGeom prst="rect">
+            <a:avLst/>
+          </a:prstGeom>
+        </p:spPr>
+      </p:pic>
+      <p:pic>
+        <p:nvPicPr>
+          <p:cNvPr id="286" name="Picture 285"/>
+          <p:cNvPicPr>
+            <a:picLocks noChangeAspect="1"/>
+          </p:cNvPicPr>
+          <p:nvPr/>
+        </p:nvPicPr>
+        <p:blipFill rotWithShape="1">
+          <a:blip r:embed="rId10">
+            <a:extLst>
+              <a:ext uri="{28A0092B-C50C-407E-A947-70E740481C1C}">
+                <a14:useLocalDpi xmlns:a14="http://schemas.microsoft.com/office/drawing/2010/main" val="0"/>
+              </a:ext>
+            </a:extLst>
+          </a:blip>
+          <a:srcRect l="29405" t="2445" r="29744" b="21601"/>
+          <a:stretch/>
+        </p:blipFill>
+        <p:spPr>
+          <a:xfrm>
+            <a:off x="2387658" y="26234329"/>
+            <a:ext cx="9728142" cy="9891512"/>
+          </a:xfrm>
+          <a:prstGeom prst="rect">
+            <a:avLst/>
+          </a:prstGeom>
+        </p:spPr>
+      </p:pic>
+      <p:pic>
+        <p:nvPicPr>
+          <p:cNvPr id="58" name="Picture 57"/>
+          <p:cNvPicPr>
+            <a:picLocks noChangeAspect="1"/>
+          </p:cNvPicPr>
+          <p:nvPr/>
+        </p:nvPicPr>
+        <p:blipFill rotWithShape="1">
+          <a:blip r:embed="rId11">
+            <a:extLst>
+              <a:ext uri="{28A0092B-C50C-407E-A947-70E740481C1C}">
+                <a14:useLocalDpi xmlns:a14="http://schemas.microsoft.com/office/drawing/2010/main" val="0"/>
+              </a:ext>
+            </a:extLst>
+          </a:blip>
+          <a:srcRect b="44221"/>
+          <a:stretch/>
+        </p:blipFill>
+        <p:spPr>
+          <a:xfrm>
+            <a:off x="924326" y="25727926"/>
+            <a:ext cx="2110279" cy="2906377"/>
+          </a:xfrm>
+          <a:prstGeom prst="round2DiagRect">
+            <a:avLst>
+              <a:gd name="adj1" fmla="val 50000"/>
+              <a:gd name="adj2" fmla="val 0"/>
+            </a:avLst>
+          </a:prstGeom>
+        </p:spPr>
+      </p:pic>
+      <p:sp>
+        <p:nvSpPr>
+          <p:cNvPr id="57" name="TextBox 56"/>
+          <p:cNvSpPr txBox="1"/>
+          <p:nvPr/>
+        </p:nvSpPr>
+        <p:spPr>
+          <a:xfrm>
+            <a:off x="4832846" y="25395816"/>
+            <a:ext cx="3942561" cy="646331"/>
+          </a:xfrm>
+          <a:prstGeom prst="rect">
+            <a:avLst/>
+          </a:prstGeom>
+          <a:noFill/>
+        </p:spPr>
+        <p:txBody>
+          <a:bodyPr wrap="square" rtlCol="0">
+            <a:spAutoFit/>
+          </a:bodyPr>
+          <a:lstStyle/>
+          <a:p>
+            <a:r>
+              <a:rPr lang="en-US" sz="3600" u="sng" dirty="0" smtClean="0"/>
+              <a:t>Main Page</a:t>
+            </a:r>
+            <a:endParaRPr lang="en-US" sz="5400" u="sng" dirty="0"/>
+          </a:p>
+        </p:txBody>
+      </p:sp>
+      <p:pic>
+        <p:nvPicPr>
+          <p:cNvPr id="287" name="Picture 286"/>
+          <p:cNvPicPr>
+            <a:picLocks noChangeAspect="1"/>
+          </p:cNvPicPr>
+          <p:nvPr/>
+        </p:nvPicPr>
+        <p:blipFill rotWithShape="1">
+          <a:blip r:embed="rId12">
+            <a:extLst>
+              <a:ext uri="{28A0092B-C50C-407E-A947-70E740481C1C}">
+                <a14:useLocalDpi xmlns:a14="http://schemas.microsoft.com/office/drawing/2010/main" val="0"/>
+              </a:ext>
+            </a:extLst>
+          </a:blip>
+          <a:srcRect l="15287" t="2021" r="28096" b="54510"/>
+          <a:stretch/>
+        </p:blipFill>
+        <p:spPr>
+          <a:xfrm>
+            <a:off x="17135115" y="26165150"/>
+            <a:ext cx="9908957" cy="4160462"/>
+          </a:xfrm>
+          <a:prstGeom prst="rect">
+            <a:avLst/>
+          </a:prstGeom>
+        </p:spPr>
+      </p:pic>
+      <p:pic>
+        <p:nvPicPr>
+          <p:cNvPr id="64" name="Picture 63"/>
+          <p:cNvPicPr>
+            <a:picLocks noChangeAspect="1"/>
+          </p:cNvPicPr>
+          <p:nvPr/>
+        </p:nvPicPr>
+        <p:blipFill rotWithShape="1">
+          <a:blip r:embed="rId13">
+            <a:extLst>
+              <a:ext uri="{28A0092B-C50C-407E-A947-70E740481C1C}">
+                <a14:useLocalDpi xmlns:a14="http://schemas.microsoft.com/office/drawing/2010/main" val="0"/>
+              </a:ext>
+            </a:extLst>
+          </a:blip>
+          <a:srcRect l="15162" t="2195" r="17224" b="30060"/>
+          <a:stretch/>
+        </p:blipFill>
+        <p:spPr>
+          <a:xfrm>
+            <a:off x="17757050" y="31529308"/>
+            <a:ext cx="8711669" cy="4773421"/>
           </a:xfrm>
           <a:prstGeom prst="rect">
             <a:avLst/>

</xml_diff>